<commit_message>
edited some errors on slides
</commit_message>
<xml_diff>
--- a/Lesson1/L1_slides/L1_slides.pptx
+++ b/Lesson1/L1_slides/L1_slides.pptx
@@ -5106,7 +5106,7 @@
             </a:pPr>
             <a:r>
               <a:rPr lang="en-SG" dirty="0"/>
-              <a:t>This is a built-in C function that lets your print (show) output onto screen</a:t>
+              <a:t>This is a built-in C function that lets you print (show) output onto screen</a:t>
             </a:r>
           </a:p>
           <a:p>
@@ -6769,7 +6769,7 @@
             <a:pPr lvl="1"/>
             <a:r>
               <a:rPr lang="en-SG" dirty="0"/>
-              <a:t>Compile</a:t>
+              <a:t>Compile code</a:t>
             </a:r>
           </a:p>
           <a:p>
@@ -10680,7 +10680,7 @@
             <a:avLst/>
           </a:prstGeom>
           <a:solidFill>
-            <a:srgbClr val="FF0000"/>
+            <a:schemeClr val="accent1"/>
           </a:solidFill>
           <a:ln w="38100">
             <a:solidFill>
@@ -11593,6 +11593,451 @@
           </a:p>
         </p:txBody>
       </p:sp>
+      <p:sp>
+        <p:nvSpPr>
+          <p:cNvPr id="16" name="TextBox 15">
+            <a:extLst>
+              <a:ext uri="{FF2B5EF4-FFF2-40B4-BE49-F238E27FC236}">
+                <a16:creationId xmlns:a16="http://schemas.microsoft.com/office/drawing/2014/main" id="{8D4975CC-260A-48AB-AE39-F84AAF98B4F5}"/>
+              </a:ext>
+            </a:extLst>
+          </p:cNvPr>
+          <p:cNvSpPr txBox="1"/>
+          <p:nvPr/>
+        </p:nvSpPr>
+        <p:spPr>
+          <a:xfrm>
+            <a:off x="1652954" y="3935462"/>
+            <a:ext cx="967154" cy="646331"/>
+          </a:xfrm>
+          <a:prstGeom prst="rect">
+            <a:avLst/>
+          </a:prstGeom>
+          <a:solidFill>
+            <a:schemeClr val="accent1"/>
+          </a:solidFill>
+          <a:ln w="38100">
+            <a:solidFill>
+              <a:schemeClr val="tx1"/>
+            </a:solidFill>
+          </a:ln>
+        </p:spPr>
+        <p:txBody>
+          <a:bodyPr wrap="square" rtlCol="0">
+            <a:spAutoFit/>
+          </a:bodyPr>
+          <a:lstStyle/>
+          <a:p>
+            <a:pPr algn="ctr"/>
+            <a:r>
+              <a:rPr lang="en-SG" sz="3600" dirty="0"/>
+              <a:t> </a:t>
+            </a:r>
+            <a:endParaRPr lang="en-SG" dirty="0"/>
+          </a:p>
+        </p:txBody>
+      </p:sp>
+      <p:sp>
+        <p:nvSpPr>
+          <p:cNvPr id="17" name="TextBox 16">
+            <a:extLst>
+              <a:ext uri="{FF2B5EF4-FFF2-40B4-BE49-F238E27FC236}">
+                <a16:creationId xmlns:a16="http://schemas.microsoft.com/office/drawing/2014/main" id="{072869BC-2B36-4A71-93B4-3B407F034785}"/>
+              </a:ext>
+            </a:extLst>
+          </p:cNvPr>
+          <p:cNvSpPr txBox="1"/>
+          <p:nvPr/>
+        </p:nvSpPr>
+        <p:spPr>
+          <a:xfrm>
+            <a:off x="1222130" y="3944254"/>
+            <a:ext cx="527539" cy="584775"/>
+          </a:xfrm>
+          <a:prstGeom prst="rect">
+            <a:avLst/>
+          </a:prstGeom>
+          <a:noFill/>
+        </p:spPr>
+        <p:txBody>
+          <a:bodyPr wrap="square" rtlCol="0">
+            <a:spAutoFit/>
+          </a:bodyPr>
+          <a:lstStyle/>
+          <a:p>
+            <a:r>
+              <a:rPr lang="en-SG" sz="3200" dirty="0"/>
+              <a:t>x</a:t>
+            </a:r>
+            <a:endParaRPr lang="en-SG" dirty="0"/>
+          </a:p>
+        </p:txBody>
+      </p:sp>
+      <p:sp>
+        <p:nvSpPr>
+          <p:cNvPr id="21" name="TextBox 20">
+            <a:extLst>
+              <a:ext uri="{FF2B5EF4-FFF2-40B4-BE49-F238E27FC236}">
+                <a16:creationId xmlns:a16="http://schemas.microsoft.com/office/drawing/2014/main" id="{3E6F33CA-D5B2-4D75-AA14-36D9B7E89EE9}"/>
+              </a:ext>
+            </a:extLst>
+          </p:cNvPr>
+          <p:cNvSpPr txBox="1"/>
+          <p:nvPr/>
+        </p:nvSpPr>
+        <p:spPr>
+          <a:xfrm>
+            <a:off x="1652953" y="4882734"/>
+            <a:ext cx="2189285" cy="646331"/>
+          </a:xfrm>
+          <a:prstGeom prst="rect">
+            <a:avLst/>
+          </a:prstGeom>
+          <a:solidFill>
+            <a:schemeClr val="accent1"/>
+          </a:solidFill>
+          <a:ln w="38100">
+            <a:solidFill>
+              <a:schemeClr val="tx1"/>
+            </a:solidFill>
+          </a:ln>
+        </p:spPr>
+        <p:txBody>
+          <a:bodyPr wrap="square" rtlCol="0">
+            <a:spAutoFit/>
+          </a:bodyPr>
+          <a:lstStyle/>
+          <a:p>
+            <a:pPr algn="ctr"/>
+            <a:r>
+              <a:rPr lang="en-SG" sz="3600" dirty="0"/>
+              <a:t>99999999</a:t>
+            </a:r>
+            <a:endParaRPr lang="en-SG" dirty="0"/>
+          </a:p>
+        </p:txBody>
+      </p:sp>
+      <p:sp>
+        <p:nvSpPr>
+          <p:cNvPr id="22" name="TextBox 21">
+            <a:extLst>
+              <a:ext uri="{FF2B5EF4-FFF2-40B4-BE49-F238E27FC236}">
+                <a16:creationId xmlns:a16="http://schemas.microsoft.com/office/drawing/2014/main" id="{1286D276-9EC8-44EB-8A0A-FA5D2EB0CD45}"/>
+              </a:ext>
+            </a:extLst>
+          </p:cNvPr>
+          <p:cNvSpPr txBox="1"/>
+          <p:nvPr/>
+        </p:nvSpPr>
+        <p:spPr>
+          <a:xfrm>
+            <a:off x="1222130" y="4891526"/>
+            <a:ext cx="527539" cy="584775"/>
+          </a:xfrm>
+          <a:prstGeom prst="rect">
+            <a:avLst/>
+          </a:prstGeom>
+          <a:noFill/>
+        </p:spPr>
+        <p:txBody>
+          <a:bodyPr wrap="square" rtlCol="0">
+            <a:spAutoFit/>
+          </a:bodyPr>
+          <a:lstStyle/>
+          <a:p>
+            <a:r>
+              <a:rPr lang="en-SG" sz="3200" dirty="0"/>
+              <a:t>y</a:t>
+            </a:r>
+            <a:endParaRPr lang="en-SG" dirty="0"/>
+          </a:p>
+        </p:txBody>
+      </p:sp>
+      <p:sp>
+        <p:nvSpPr>
+          <p:cNvPr id="23" name="TextBox 22">
+            <a:extLst>
+              <a:ext uri="{FF2B5EF4-FFF2-40B4-BE49-F238E27FC236}">
+                <a16:creationId xmlns:a16="http://schemas.microsoft.com/office/drawing/2014/main" id="{7F1F3BB1-49BE-475E-A465-FFE8295A5ECB}"/>
+              </a:ext>
+            </a:extLst>
+          </p:cNvPr>
+          <p:cNvSpPr txBox="1"/>
+          <p:nvPr/>
+        </p:nvSpPr>
+        <p:spPr>
+          <a:xfrm>
+            <a:off x="704849" y="4082752"/>
+            <a:ext cx="301869" cy="307777"/>
+          </a:xfrm>
+          <a:prstGeom prst="rect">
+            <a:avLst/>
+          </a:prstGeom>
+          <a:solidFill>
+            <a:srgbClr val="FF0000"/>
+          </a:solidFill>
+        </p:spPr>
+        <p:txBody>
+          <a:bodyPr wrap="square" rtlCol="0">
+            <a:spAutoFit/>
+          </a:bodyPr>
+          <a:lstStyle/>
+          <a:p>
+            <a:pPr algn="ctr"/>
+            <a:r>
+              <a:rPr lang="en-SG" sz="1400" dirty="0"/>
+              <a:t>1</a:t>
+            </a:r>
+            <a:endParaRPr lang="en-SG" dirty="0"/>
+          </a:p>
+        </p:txBody>
+      </p:sp>
+      <p:sp>
+        <p:nvSpPr>
+          <p:cNvPr id="24" name="TextBox 23">
+            <a:extLst>
+              <a:ext uri="{FF2B5EF4-FFF2-40B4-BE49-F238E27FC236}">
+                <a16:creationId xmlns:a16="http://schemas.microsoft.com/office/drawing/2014/main" id="{E07F948C-4282-44A7-B3B1-1E590C296736}"/>
+              </a:ext>
+            </a:extLst>
+          </p:cNvPr>
+          <p:cNvSpPr txBox="1"/>
+          <p:nvPr/>
+        </p:nvSpPr>
+        <p:spPr>
+          <a:xfrm>
+            <a:off x="687265" y="5030024"/>
+            <a:ext cx="301869" cy="307777"/>
+          </a:xfrm>
+          <a:prstGeom prst="rect">
+            <a:avLst/>
+          </a:prstGeom>
+          <a:solidFill>
+            <a:srgbClr val="FF0000"/>
+          </a:solidFill>
+        </p:spPr>
+        <p:txBody>
+          <a:bodyPr wrap="square" rtlCol="0">
+            <a:spAutoFit/>
+          </a:bodyPr>
+          <a:lstStyle/>
+          <a:p>
+            <a:pPr algn="ctr"/>
+            <a:r>
+              <a:rPr lang="en-SG" sz="1400" dirty="0"/>
+              <a:t>2</a:t>
+            </a:r>
+            <a:endParaRPr lang="en-SG" dirty="0"/>
+          </a:p>
+        </p:txBody>
+      </p:sp>
+      <p:sp>
+        <p:nvSpPr>
+          <p:cNvPr id="25" name="TextBox 24">
+            <a:extLst>
+              <a:ext uri="{FF2B5EF4-FFF2-40B4-BE49-F238E27FC236}">
+                <a16:creationId xmlns:a16="http://schemas.microsoft.com/office/drawing/2014/main" id="{9DC83C60-615E-406A-80F0-DF0CB0738266}"/>
+              </a:ext>
+            </a:extLst>
+          </p:cNvPr>
+          <p:cNvSpPr txBox="1"/>
+          <p:nvPr/>
+        </p:nvSpPr>
+        <p:spPr>
+          <a:xfrm>
+            <a:off x="1642696" y="5786034"/>
+            <a:ext cx="967154" cy="646331"/>
+          </a:xfrm>
+          <a:prstGeom prst="rect">
+            <a:avLst/>
+          </a:prstGeom>
+          <a:solidFill>
+            <a:schemeClr val="accent1"/>
+          </a:solidFill>
+          <a:ln w="38100">
+            <a:solidFill>
+              <a:schemeClr val="tx1"/>
+            </a:solidFill>
+          </a:ln>
+        </p:spPr>
+        <p:txBody>
+          <a:bodyPr wrap="square" rtlCol="0">
+            <a:spAutoFit/>
+          </a:bodyPr>
+          <a:lstStyle/>
+          <a:p>
+            <a:pPr algn="ctr"/>
+            <a:r>
+              <a:rPr lang="en-SG" sz="3600" dirty="0"/>
+              <a:t> </a:t>
+            </a:r>
+            <a:endParaRPr lang="en-SG" dirty="0"/>
+          </a:p>
+        </p:txBody>
+      </p:sp>
+      <p:sp>
+        <p:nvSpPr>
+          <p:cNvPr id="26" name="TextBox 25">
+            <a:extLst>
+              <a:ext uri="{FF2B5EF4-FFF2-40B4-BE49-F238E27FC236}">
+                <a16:creationId xmlns:a16="http://schemas.microsoft.com/office/drawing/2014/main" id="{0F3DB22D-964A-4CDD-8D1F-7A19F320A20F}"/>
+              </a:ext>
+            </a:extLst>
+          </p:cNvPr>
+          <p:cNvSpPr txBox="1"/>
+          <p:nvPr/>
+        </p:nvSpPr>
+        <p:spPr>
+          <a:xfrm>
+            <a:off x="1211872" y="5794826"/>
+            <a:ext cx="527539" cy="584775"/>
+          </a:xfrm>
+          <a:prstGeom prst="rect">
+            <a:avLst/>
+          </a:prstGeom>
+          <a:noFill/>
+        </p:spPr>
+        <p:txBody>
+          <a:bodyPr wrap="square" rtlCol="0">
+            <a:spAutoFit/>
+          </a:bodyPr>
+          <a:lstStyle/>
+          <a:p>
+            <a:r>
+              <a:rPr lang="en-SG" sz="3200" dirty="0"/>
+              <a:t>x</a:t>
+            </a:r>
+            <a:endParaRPr lang="en-SG" dirty="0"/>
+          </a:p>
+        </p:txBody>
+      </p:sp>
+      <p:sp>
+        <p:nvSpPr>
+          <p:cNvPr id="6" name="Arrow: Curved Down 5">
+            <a:extLst>
+              <a:ext uri="{FF2B5EF4-FFF2-40B4-BE49-F238E27FC236}">
+                <a16:creationId xmlns:a16="http://schemas.microsoft.com/office/drawing/2014/main" id="{BEDFC657-FC41-4C4E-8A90-B7E8781D6555}"/>
+              </a:ext>
+            </a:extLst>
+          </p:cNvPr>
+          <p:cNvSpPr/>
+          <p:nvPr/>
+        </p:nvSpPr>
+        <p:spPr>
+          <a:xfrm rot="10800000">
+            <a:off x="2319466" y="6173785"/>
+            <a:ext cx="1171079" cy="365126"/>
+          </a:xfrm>
+          <a:prstGeom prst="curvedDownArrow">
+            <a:avLst/>
+          </a:prstGeom>
+          <a:solidFill>
+            <a:srgbClr val="FF0000"/>
+          </a:solidFill>
+        </p:spPr>
+        <p:style>
+          <a:lnRef idx="2">
+            <a:schemeClr val="accent1">
+              <a:shade val="50000"/>
+            </a:schemeClr>
+          </a:lnRef>
+          <a:fillRef idx="1">
+            <a:schemeClr val="accent1"/>
+          </a:fillRef>
+          <a:effectRef idx="0">
+            <a:schemeClr val="accent1"/>
+          </a:effectRef>
+          <a:fontRef idx="minor">
+            <a:schemeClr val="lt1"/>
+          </a:fontRef>
+        </p:style>
+        <p:txBody>
+          <a:bodyPr rtlCol="0" anchor="ctr"/>
+          <a:lstStyle/>
+          <a:p>
+            <a:pPr algn="ctr"/>
+            <a:endParaRPr lang="en-SG">
+              <a:solidFill>
+                <a:schemeClr val="tx1"/>
+              </a:solidFill>
+            </a:endParaRPr>
+          </a:p>
+        </p:txBody>
+      </p:sp>
+      <p:sp>
+        <p:nvSpPr>
+          <p:cNvPr id="7" name="TextBox 6">
+            <a:extLst>
+              <a:ext uri="{FF2B5EF4-FFF2-40B4-BE49-F238E27FC236}">
+                <a16:creationId xmlns:a16="http://schemas.microsoft.com/office/drawing/2014/main" id="{F6221741-64FE-4E94-92AF-A2C3DD2DE061}"/>
+              </a:ext>
+            </a:extLst>
+          </p:cNvPr>
+          <p:cNvSpPr txBox="1"/>
+          <p:nvPr/>
+        </p:nvSpPr>
+        <p:spPr>
+          <a:xfrm>
+            <a:off x="3506688" y="5686930"/>
+            <a:ext cx="799108" cy="646331"/>
+          </a:xfrm>
+          <a:prstGeom prst="rect">
+            <a:avLst/>
+          </a:prstGeom>
+          <a:noFill/>
+        </p:spPr>
+        <p:txBody>
+          <a:bodyPr wrap="square" rtlCol="0">
+            <a:spAutoFit/>
+          </a:bodyPr>
+          <a:lstStyle/>
+          <a:p>
+            <a:r>
+              <a:rPr lang="en-SG" sz="3600" dirty="0"/>
+              <a:t>4</a:t>
+            </a:r>
+          </a:p>
+        </p:txBody>
+      </p:sp>
+      <p:sp>
+        <p:nvSpPr>
+          <p:cNvPr id="27" name="TextBox 26">
+            <a:extLst>
+              <a:ext uri="{FF2B5EF4-FFF2-40B4-BE49-F238E27FC236}">
+                <a16:creationId xmlns:a16="http://schemas.microsoft.com/office/drawing/2014/main" id="{F80B6D5B-002C-434F-905D-3025C1EA77F0}"/>
+              </a:ext>
+            </a:extLst>
+          </p:cNvPr>
+          <p:cNvSpPr txBox="1"/>
+          <p:nvPr/>
+        </p:nvSpPr>
+        <p:spPr>
+          <a:xfrm>
+            <a:off x="665134" y="5933324"/>
+            <a:ext cx="301869" cy="307777"/>
+          </a:xfrm>
+          <a:prstGeom prst="rect">
+            <a:avLst/>
+          </a:prstGeom>
+          <a:solidFill>
+            <a:srgbClr val="FF0000"/>
+          </a:solidFill>
+        </p:spPr>
+        <p:txBody>
+          <a:bodyPr wrap="square" rtlCol="0">
+            <a:spAutoFit/>
+          </a:bodyPr>
+          <a:lstStyle/>
+          <a:p>
+            <a:pPr algn="ctr"/>
+            <a:r>
+              <a:rPr lang="en-SG" sz="1400" dirty="0"/>
+              <a:t>3</a:t>
+            </a:r>
+            <a:endParaRPr lang="en-SG" dirty="0"/>
+          </a:p>
+        </p:txBody>
+      </p:sp>
     </p:spTree>
     <p:extLst>
       <p:ext uri="{BB962C8B-B14F-4D97-AF65-F5344CB8AC3E}">
@@ -12326,7 +12771,7 @@
           <p:nvPr>
             <p:extLst>
               <p:ext uri="{D42A27DB-BD31-4B8C-83A1-F6EECF244321}">
-                <p14:modId xmlns:p14="http://schemas.microsoft.com/office/powerpoint/2010/main" val="1833906957"/>
+                <p14:modId xmlns:p14="http://schemas.microsoft.com/office/powerpoint/2010/main" val="3633152525"/>
               </p:ext>
             </p:extLst>
           </p:nvPr>
@@ -12517,7 +12962,7 @@
                     <a:p>
                       <a:r>
                         <a:rPr lang="en-SG" dirty="0"/>
-                        <a:t>Float</a:t>
+                        <a:t>float</a:t>
                       </a:r>
                     </a:p>
                   </a:txBody>
@@ -12574,7 +13019,7 @@
                     <a:p>
                       <a:r>
                         <a:rPr lang="en-SG" dirty="0"/>
-                        <a:t>Double</a:t>
+                        <a:t>double</a:t>
                       </a:r>
                     </a:p>
                   </a:txBody>
@@ -16218,7 +16663,7 @@
           <a:p>
             <a:r>
               <a:rPr lang="en-SG" dirty="0"/>
-              <a:t>Expressions in opening and close parentheses will be computed first</a:t>
+              <a:t>Expressions in opening and closing parentheses will be computed first</a:t>
             </a:r>
           </a:p>
           <a:p>
@@ -17945,171 +18390,12 @@
           <a:chExt cx="0" cy="0"/>
         </a:xfrm>
       </p:grpSpPr>
-      <p:sp>
-        <p:nvSpPr>
-          <p:cNvPr id="2" name="Title 1">
-            <a:extLst>
-              <a:ext uri="{FF2B5EF4-FFF2-40B4-BE49-F238E27FC236}">
-                <a16:creationId xmlns:a16="http://schemas.microsoft.com/office/drawing/2014/main" id="{2E664350-FB58-40EA-9C21-540825FFDC51}"/>
-              </a:ext>
-            </a:extLst>
-          </p:cNvPr>
-          <p:cNvSpPr>
-            <a:spLocks noGrp="1"/>
-          </p:cNvSpPr>
-          <p:nvPr>
-            <p:ph type="title"/>
-          </p:nvPr>
-        </p:nvSpPr>
-        <p:spPr/>
-        <p:txBody>
-          <a:bodyPr/>
-          <a:lstStyle/>
-          <a:p>
-            <a:r>
-              <a:rPr lang="en-SG" dirty="0"/>
-              <a:t>Conditional expressions - syntax</a:t>
-            </a:r>
-          </a:p>
-        </p:txBody>
-      </p:sp>
-      <p:sp>
-        <p:nvSpPr>
-          <p:cNvPr id="3" name="Content Placeholder 2">
-            <a:extLst>
-              <a:ext uri="{FF2B5EF4-FFF2-40B4-BE49-F238E27FC236}">
-                <a16:creationId xmlns:a16="http://schemas.microsoft.com/office/drawing/2014/main" id="{ACF0DC8F-F588-4655-A1DF-17A746BD174F}"/>
-              </a:ext>
-            </a:extLst>
-          </p:cNvPr>
-          <p:cNvSpPr>
-            <a:spLocks noGrp="1"/>
-          </p:cNvSpPr>
-          <p:nvPr>
-            <p:ph idx="1"/>
-          </p:nvPr>
-        </p:nvSpPr>
-        <p:spPr>
-          <a:xfrm>
-            <a:off x="838200" y="1825625"/>
-            <a:ext cx="10515600" cy="1875937"/>
-          </a:xfrm>
-        </p:spPr>
-        <p:txBody>
-          <a:bodyPr>
-            <a:normAutofit/>
-          </a:bodyPr>
-          <a:lstStyle/>
-          <a:p>
-            <a:pPr marL="0" indent="0">
-              <a:buNone/>
-            </a:pPr>
-            <a:r>
-              <a:rPr lang="en-SG" sz="2000" dirty="0">
-                <a:latin typeface="Courier New" panose="02070309020205020404" pitchFamily="49" charset="0"/>
-                <a:cs typeface="Courier New" panose="02070309020205020404" pitchFamily="49" charset="0"/>
-              </a:rPr>
-              <a:t>if (condition)</a:t>
-            </a:r>
-          </a:p>
-          <a:p>
-            <a:pPr marL="0" indent="0">
-              <a:buNone/>
-            </a:pPr>
-            <a:r>
-              <a:rPr lang="en-SG" sz="2000" dirty="0">
-                <a:latin typeface="Courier New" panose="02070309020205020404" pitchFamily="49" charset="0"/>
-                <a:cs typeface="Courier New" panose="02070309020205020404" pitchFamily="49" charset="0"/>
-              </a:rPr>
-              <a:t>{ body }</a:t>
-            </a:r>
-          </a:p>
-          <a:p>
-            <a:pPr marL="0" indent="0">
-              <a:buNone/>
-            </a:pPr>
-            <a:r>
-              <a:rPr lang="en-SG" sz="2000" dirty="0">
-                <a:latin typeface="Courier New" panose="02070309020205020404" pitchFamily="49" charset="0"/>
-                <a:cs typeface="Courier New" panose="02070309020205020404" pitchFamily="49" charset="0"/>
-              </a:rPr>
-              <a:t>else</a:t>
-            </a:r>
-          </a:p>
-          <a:p>
-            <a:pPr marL="0" indent="0">
-              <a:buNone/>
-            </a:pPr>
-            <a:r>
-              <a:rPr lang="en-SG" sz="2000" dirty="0">
-                <a:latin typeface="Courier New" panose="02070309020205020404" pitchFamily="49" charset="0"/>
-                <a:cs typeface="Courier New" panose="02070309020205020404" pitchFamily="49" charset="0"/>
-              </a:rPr>
-              <a:t>{ body}</a:t>
-            </a:r>
-          </a:p>
-        </p:txBody>
-      </p:sp>
-      <p:sp>
-        <p:nvSpPr>
-          <p:cNvPr id="4" name="Footer Placeholder 3">
-            <a:extLst>
-              <a:ext uri="{FF2B5EF4-FFF2-40B4-BE49-F238E27FC236}">
-                <a16:creationId xmlns:a16="http://schemas.microsoft.com/office/drawing/2014/main" id="{DFECF579-0597-4DC9-AC9D-53CDCC72C5DD}"/>
-              </a:ext>
-            </a:extLst>
-          </p:cNvPr>
-          <p:cNvSpPr>
-            <a:spLocks noGrp="1"/>
-          </p:cNvSpPr>
-          <p:nvPr>
-            <p:ph type="ftr" sz="quarter" idx="11"/>
-          </p:nvPr>
-        </p:nvSpPr>
-        <p:spPr/>
-        <p:txBody>
-          <a:bodyPr/>
-          <a:lstStyle/>
-          <a:p>
-            <a:endParaRPr lang="en-SG"/>
-          </a:p>
-        </p:txBody>
-      </p:sp>
-      <p:sp>
-        <p:nvSpPr>
-          <p:cNvPr id="5" name="Slide Number Placeholder 4">
-            <a:extLst>
-              <a:ext uri="{FF2B5EF4-FFF2-40B4-BE49-F238E27FC236}">
-                <a16:creationId xmlns:a16="http://schemas.microsoft.com/office/drawing/2014/main" id="{D84E267B-2CCE-466A-AEF5-EE34BCF0EFFD}"/>
-              </a:ext>
-            </a:extLst>
-          </p:cNvPr>
-          <p:cNvSpPr>
-            <a:spLocks noGrp="1"/>
-          </p:cNvSpPr>
-          <p:nvPr>
-            <p:ph type="sldNum" sz="quarter" idx="12"/>
-          </p:nvPr>
-        </p:nvSpPr>
-        <p:spPr/>
-        <p:txBody>
-          <a:bodyPr/>
-          <a:lstStyle/>
-          <a:p>
-            <a:fld id="{C55F0B55-3483-4EB2-93B3-0F820F21D457}" type="slidenum">
-              <a:rPr lang="en-SG" smtClean="0"/>
-              <a:t>53</a:t>
-            </a:fld>
-            <a:endParaRPr lang="en-SG"/>
-          </a:p>
-        </p:txBody>
-      </p:sp>
       <p:pic>
         <p:nvPicPr>
-          <p:cNvPr id="7" name="Picture 6">
-            <a:extLst>
-              <a:ext uri="{FF2B5EF4-FFF2-40B4-BE49-F238E27FC236}">
-                <a16:creationId xmlns:a16="http://schemas.microsoft.com/office/drawing/2014/main" id="{3C837711-FA06-414F-BF8D-019B562429C1}"/>
+          <p:cNvPr id="15" name="Picture 14">
+            <a:extLst>
+              <a:ext uri="{FF2B5EF4-FFF2-40B4-BE49-F238E27FC236}">
+                <a16:creationId xmlns:a16="http://schemas.microsoft.com/office/drawing/2014/main" id="{1F72E661-3EA9-4F35-A18C-4EED06510B9A}"/>
               </a:ext>
             </a:extLst>
           </p:cNvPr>
@@ -18132,8 +18418,8 @@
         </p:blipFill>
         <p:spPr>
           <a:xfrm>
-            <a:off x="933450" y="3701562"/>
-            <a:ext cx="7219950" cy="2238375"/>
+            <a:off x="993860" y="3669230"/>
+            <a:ext cx="4803202" cy="2379051"/>
           </a:xfrm>
           <a:prstGeom prst="rect">
             <a:avLst/>
@@ -18142,6 +18428,165 @@
       </p:pic>
       <p:sp>
         <p:nvSpPr>
+          <p:cNvPr id="2" name="Title 1">
+            <a:extLst>
+              <a:ext uri="{FF2B5EF4-FFF2-40B4-BE49-F238E27FC236}">
+                <a16:creationId xmlns:a16="http://schemas.microsoft.com/office/drawing/2014/main" id="{2E664350-FB58-40EA-9C21-540825FFDC51}"/>
+              </a:ext>
+            </a:extLst>
+          </p:cNvPr>
+          <p:cNvSpPr>
+            <a:spLocks noGrp="1"/>
+          </p:cNvSpPr>
+          <p:nvPr>
+            <p:ph type="title"/>
+          </p:nvPr>
+        </p:nvSpPr>
+        <p:spPr/>
+        <p:txBody>
+          <a:bodyPr/>
+          <a:lstStyle/>
+          <a:p>
+            <a:r>
+              <a:rPr lang="en-SG" dirty="0"/>
+              <a:t>Conditional expressions - syntax</a:t>
+            </a:r>
+          </a:p>
+        </p:txBody>
+      </p:sp>
+      <p:sp>
+        <p:nvSpPr>
+          <p:cNvPr id="3" name="Content Placeholder 2">
+            <a:extLst>
+              <a:ext uri="{FF2B5EF4-FFF2-40B4-BE49-F238E27FC236}">
+                <a16:creationId xmlns:a16="http://schemas.microsoft.com/office/drawing/2014/main" id="{ACF0DC8F-F588-4655-A1DF-17A746BD174F}"/>
+              </a:ext>
+            </a:extLst>
+          </p:cNvPr>
+          <p:cNvSpPr>
+            <a:spLocks noGrp="1"/>
+          </p:cNvSpPr>
+          <p:nvPr>
+            <p:ph idx="1"/>
+          </p:nvPr>
+        </p:nvSpPr>
+        <p:spPr>
+          <a:xfrm>
+            <a:off x="838200" y="1825625"/>
+            <a:ext cx="10515600" cy="1875937"/>
+          </a:xfrm>
+        </p:spPr>
+        <p:txBody>
+          <a:bodyPr>
+            <a:normAutofit/>
+          </a:bodyPr>
+          <a:lstStyle/>
+          <a:p>
+            <a:pPr marL="0" indent="0">
+              <a:buNone/>
+            </a:pPr>
+            <a:r>
+              <a:rPr lang="en-SG" sz="2000" dirty="0">
+                <a:latin typeface="Courier New" panose="02070309020205020404" pitchFamily="49" charset="0"/>
+                <a:cs typeface="Courier New" panose="02070309020205020404" pitchFamily="49" charset="0"/>
+              </a:rPr>
+              <a:t>if (condition)</a:t>
+            </a:r>
+          </a:p>
+          <a:p>
+            <a:pPr marL="0" indent="0">
+              <a:buNone/>
+            </a:pPr>
+            <a:r>
+              <a:rPr lang="en-SG" sz="2000" dirty="0">
+                <a:latin typeface="Courier New" panose="02070309020205020404" pitchFamily="49" charset="0"/>
+                <a:cs typeface="Courier New" panose="02070309020205020404" pitchFamily="49" charset="0"/>
+              </a:rPr>
+              <a:t>{ body }</a:t>
+            </a:r>
+          </a:p>
+          <a:p>
+            <a:pPr marL="0" indent="0">
+              <a:buNone/>
+            </a:pPr>
+            <a:r>
+              <a:rPr lang="en-SG" sz="2000" dirty="0">
+                <a:latin typeface="Courier New" panose="02070309020205020404" pitchFamily="49" charset="0"/>
+                <a:cs typeface="Courier New" panose="02070309020205020404" pitchFamily="49" charset="0"/>
+              </a:rPr>
+              <a:t>else</a:t>
+            </a:r>
+          </a:p>
+          <a:p>
+            <a:pPr marL="0" indent="0">
+              <a:buNone/>
+            </a:pPr>
+            <a:r>
+              <a:rPr lang="en-SG" sz="2000" dirty="0">
+                <a:latin typeface="Courier New" panose="02070309020205020404" pitchFamily="49" charset="0"/>
+                <a:cs typeface="Courier New" panose="02070309020205020404" pitchFamily="49" charset="0"/>
+              </a:rPr>
+              <a:t>{ body}</a:t>
+            </a:r>
+          </a:p>
+        </p:txBody>
+      </p:sp>
+      <p:sp>
+        <p:nvSpPr>
+          <p:cNvPr id="4" name="Footer Placeholder 3">
+            <a:extLst>
+              <a:ext uri="{FF2B5EF4-FFF2-40B4-BE49-F238E27FC236}">
+                <a16:creationId xmlns:a16="http://schemas.microsoft.com/office/drawing/2014/main" id="{DFECF579-0597-4DC9-AC9D-53CDCC72C5DD}"/>
+              </a:ext>
+            </a:extLst>
+          </p:cNvPr>
+          <p:cNvSpPr>
+            <a:spLocks noGrp="1"/>
+          </p:cNvSpPr>
+          <p:nvPr>
+            <p:ph type="ftr" sz="quarter" idx="11"/>
+          </p:nvPr>
+        </p:nvSpPr>
+        <p:spPr/>
+        <p:txBody>
+          <a:bodyPr/>
+          <a:lstStyle/>
+          <a:p>
+            <a:endParaRPr lang="en-SG"/>
+          </a:p>
+        </p:txBody>
+      </p:sp>
+      <p:sp>
+        <p:nvSpPr>
+          <p:cNvPr id="5" name="Slide Number Placeholder 4">
+            <a:extLst>
+              <a:ext uri="{FF2B5EF4-FFF2-40B4-BE49-F238E27FC236}">
+                <a16:creationId xmlns:a16="http://schemas.microsoft.com/office/drawing/2014/main" id="{D84E267B-2CCE-466A-AEF5-EE34BCF0EFFD}"/>
+              </a:ext>
+            </a:extLst>
+          </p:cNvPr>
+          <p:cNvSpPr>
+            <a:spLocks noGrp="1"/>
+          </p:cNvSpPr>
+          <p:nvPr>
+            <p:ph type="sldNum" sz="quarter" idx="12"/>
+          </p:nvPr>
+        </p:nvSpPr>
+        <p:spPr/>
+        <p:txBody>
+          <a:bodyPr/>
+          <a:lstStyle/>
+          <a:p>
+            <a:fld id="{C55F0B55-3483-4EB2-93B3-0F820F21D457}" type="slidenum">
+              <a:rPr lang="en-SG" smtClean="0"/>
+              <a:t>53</a:t>
+            </a:fld>
+            <a:endParaRPr lang="en-SG"/>
+          </a:p>
+        </p:txBody>
+      </p:sp>
+      <p:sp>
+        <p:nvSpPr>
           <p:cNvPr id="8" name="TextBox 7">
             <a:extLst>
               <a:ext uri="{FF2B5EF4-FFF2-40B4-BE49-F238E27FC236}">
@@ -18154,7 +18599,7 @@
         </p:nvSpPr>
         <p:spPr>
           <a:xfrm>
-            <a:off x="8491904" y="4227445"/>
+            <a:off x="6722452" y="4283753"/>
             <a:ext cx="2861896" cy="646331"/>
           </a:xfrm>
           <a:prstGeom prst="rect">
@@ -18311,7 +18756,7 @@
                   <a:srgbClr val="FF0000"/>
                 </a:solidFill>
               </a:rPr>
-              <a:t>Evaluates to true</a:t>
+              <a:t>Evaluates to false</a:t>
             </a:r>
           </a:p>
         </p:txBody>
@@ -18387,6 +18832,42 @@
           <a:chExt cx="0" cy="0"/>
         </a:xfrm>
       </p:grpSpPr>
+      <p:pic>
+        <p:nvPicPr>
+          <p:cNvPr id="7" name="Picture 6">
+            <a:extLst>
+              <a:ext uri="{FF2B5EF4-FFF2-40B4-BE49-F238E27FC236}">
+                <a16:creationId xmlns:a16="http://schemas.microsoft.com/office/drawing/2014/main" id="{583B0EFC-EFD2-484D-AF0E-5F3CD0CAF20F}"/>
+              </a:ext>
+            </a:extLst>
+          </p:cNvPr>
+          <p:cNvPicPr>
+            <a:picLocks noChangeAspect="1"/>
+          </p:cNvPicPr>
+          <p:nvPr/>
+        </p:nvPicPr>
+        <p:blipFill>
+          <a:blip r:embed="rId2">
+            <a:extLst>
+              <a:ext uri="{28A0092B-C50C-407E-A947-70E740481C1C}">
+                <a14:useLocalDpi xmlns:a14="http://schemas.microsoft.com/office/drawing/2010/main" val="0"/>
+              </a:ext>
+            </a:extLst>
+          </a:blip>
+          <a:stretch>
+            <a:fillRect/>
+          </a:stretch>
+        </p:blipFill>
+        <p:spPr>
+          <a:xfrm>
+            <a:off x="6286500" y="1846830"/>
+            <a:ext cx="4503494" cy="2768639"/>
+          </a:xfrm>
+          <a:prstGeom prst="rect">
+            <a:avLst/>
+          </a:prstGeom>
+        </p:spPr>
+      </p:pic>
       <p:sp>
         <p:nvSpPr>
           <p:cNvPr id="2" name="Title 1">
@@ -18612,42 +19093,6 @@
           </a:p>
         </p:txBody>
       </p:sp>
-      <p:pic>
-        <p:nvPicPr>
-          <p:cNvPr id="10" name="Picture 9">
-            <a:extLst>
-              <a:ext uri="{FF2B5EF4-FFF2-40B4-BE49-F238E27FC236}">
-                <a16:creationId xmlns:a16="http://schemas.microsoft.com/office/drawing/2014/main" id="{BE42B516-17F0-4E2D-BBD5-CEF788F951AD}"/>
-              </a:ext>
-            </a:extLst>
-          </p:cNvPr>
-          <p:cNvPicPr>
-            <a:picLocks noChangeAspect="1"/>
-          </p:cNvPicPr>
-          <p:nvPr/>
-        </p:nvPicPr>
-        <p:blipFill>
-          <a:blip r:embed="rId2">
-            <a:extLst>
-              <a:ext uri="{28A0092B-C50C-407E-A947-70E740481C1C}">
-                <a14:useLocalDpi xmlns:a14="http://schemas.microsoft.com/office/drawing/2010/main" val="0"/>
-              </a:ext>
-            </a:extLst>
-          </a:blip>
-          <a:stretch>
-            <a:fillRect/>
-          </a:stretch>
-        </p:blipFill>
-        <p:spPr>
-          <a:xfrm>
-            <a:off x="6413256" y="1699480"/>
-            <a:ext cx="4552950" cy="2876550"/>
-          </a:xfrm>
-          <a:prstGeom prst="rect">
-            <a:avLst/>
-          </a:prstGeom>
-        </p:spPr>
-      </p:pic>
       <p:sp>
         <p:nvSpPr>
           <p:cNvPr id="12" name="TextBox 11">
@@ -18684,7 +19129,7 @@
           <a:p>
             <a:r>
               <a:rPr lang="en-SG" dirty="0"/>
-              <a:t>x is less than y</a:t>
+              <a:t>x is greater than y</a:t>
             </a:r>
           </a:p>
         </p:txBody>
@@ -18703,7 +19148,7 @@
         </p:nvSpPr>
         <p:spPr>
           <a:xfrm>
-            <a:off x="6858000" y="2252796"/>
+            <a:off x="6690944" y="2375888"/>
             <a:ext cx="835269" cy="335763"/>
           </a:xfrm>
           <a:prstGeom prst="ellipse">
@@ -18755,7 +19200,7 @@
         </p:nvCxnSpPr>
         <p:spPr>
           <a:xfrm flipV="1">
-            <a:off x="7693269" y="2078331"/>
+            <a:off x="7473464" y="2183838"/>
             <a:ext cx="665980" cy="267324"/>
           </a:xfrm>
           <a:prstGeom prst="straightConnector1">
@@ -18797,7 +19242,7 @@
         </p:nvSpPr>
         <p:spPr>
           <a:xfrm>
-            <a:off x="8359249" y="1909716"/>
+            <a:off x="8153400" y="1983655"/>
             <a:ext cx="2165838" cy="369332"/>
           </a:xfrm>
           <a:prstGeom prst="rect">
@@ -18836,7 +19281,7 @@
         </p:nvSpPr>
         <p:spPr>
           <a:xfrm>
-            <a:off x="7414851" y="3047034"/>
+            <a:off x="7108578" y="3059967"/>
             <a:ext cx="835269" cy="335763"/>
           </a:xfrm>
           <a:prstGeom prst="ellipse">
@@ -18890,7 +19335,7 @@
         </p:nvCxnSpPr>
         <p:spPr>
           <a:xfrm flipV="1">
-            <a:off x="8267700" y="3130062"/>
+            <a:off x="7935416" y="3048793"/>
             <a:ext cx="753208" cy="88962"/>
           </a:xfrm>
           <a:prstGeom prst="straightConnector1">
@@ -18932,7 +19377,7 @@
         </p:nvSpPr>
         <p:spPr>
           <a:xfrm>
-            <a:off x="9075492" y="2953089"/>
+            <a:off x="8748696" y="2908608"/>
             <a:ext cx="2165838" cy="369332"/>
           </a:xfrm>
           <a:prstGeom prst="rect">
@@ -18987,6 +19432,42 @@
           <a:chExt cx="0" cy="0"/>
         </a:xfrm>
       </p:grpSpPr>
+      <p:pic>
+        <p:nvPicPr>
+          <p:cNvPr id="9" name="Picture 8">
+            <a:extLst>
+              <a:ext uri="{FF2B5EF4-FFF2-40B4-BE49-F238E27FC236}">
+                <a16:creationId xmlns:a16="http://schemas.microsoft.com/office/drawing/2014/main" id="{F1AB4B0D-DBF9-47B1-AA89-B1120E7FF697}"/>
+              </a:ext>
+            </a:extLst>
+          </p:cNvPr>
+          <p:cNvPicPr>
+            <a:picLocks noChangeAspect="1"/>
+          </p:cNvPicPr>
+          <p:nvPr/>
+        </p:nvPicPr>
+        <p:blipFill>
+          <a:blip r:embed="rId2">
+            <a:extLst>
+              <a:ext uri="{28A0092B-C50C-407E-A947-70E740481C1C}">
+                <a14:useLocalDpi xmlns:a14="http://schemas.microsoft.com/office/drawing/2010/main" val="0"/>
+              </a:ext>
+            </a:extLst>
+          </a:blip>
+          <a:stretch>
+            <a:fillRect/>
+          </a:stretch>
+        </p:blipFill>
+        <p:spPr>
+          <a:xfrm>
+            <a:off x="6358564" y="1484465"/>
+            <a:ext cx="4169121" cy="3752209"/>
+          </a:xfrm>
+          <a:prstGeom prst="rect">
+            <a:avLst/>
+          </a:prstGeom>
+        </p:spPr>
+      </p:pic>
       <p:sp>
         <p:nvSpPr>
           <p:cNvPr id="2" name="Title 1">
@@ -19083,7 +19564,7 @@
         </p:nvSpPr>
         <p:spPr>
           <a:xfrm>
-            <a:off x="6515465" y="5167312"/>
+            <a:off x="6445129" y="5281608"/>
             <a:ext cx="5190392" cy="646331"/>
           </a:xfrm>
           <a:prstGeom prst="rect">
@@ -19105,47 +19586,11 @@
           <a:p>
             <a:r>
               <a:rPr lang="en-SG" dirty="0"/>
-              <a:t>x is less than y</a:t>
-            </a:r>
-          </a:p>
-        </p:txBody>
-      </p:sp>
-      <p:pic>
-        <p:nvPicPr>
-          <p:cNvPr id="7" name="Picture 6">
-            <a:extLst>
-              <a:ext uri="{FF2B5EF4-FFF2-40B4-BE49-F238E27FC236}">
-                <a16:creationId xmlns:a16="http://schemas.microsoft.com/office/drawing/2014/main" id="{54F5F5CA-CBD6-4CDF-B807-6C20CD42861F}"/>
-              </a:ext>
-            </a:extLst>
-          </p:cNvPr>
-          <p:cNvPicPr>
-            <a:picLocks noChangeAspect="1"/>
-          </p:cNvPicPr>
-          <p:nvPr/>
-        </p:nvPicPr>
-        <p:blipFill>
-          <a:blip r:embed="rId2">
-            <a:extLst>
-              <a:ext uri="{28A0092B-C50C-407E-A947-70E740481C1C}">
-                <a14:useLocalDpi xmlns:a14="http://schemas.microsoft.com/office/drawing/2010/main" val="0"/>
-              </a:ext>
-            </a:extLst>
-          </a:blip>
-          <a:stretch>
-            <a:fillRect/>
-          </a:stretch>
-        </p:blipFill>
-        <p:spPr>
-          <a:xfrm>
-            <a:off x="6556496" y="1690688"/>
-            <a:ext cx="4371975" cy="3343275"/>
-          </a:xfrm>
-          <a:prstGeom prst="rect">
-            <a:avLst/>
-          </a:prstGeom>
-        </p:spPr>
-      </p:pic>
+              <a:t>x is greater than y</a:t>
+            </a:r>
+          </a:p>
+        </p:txBody>
+      </p:sp>
       <p:sp>
         <p:nvSpPr>
           <p:cNvPr id="11" name="TextBox 10">
@@ -19495,6 +19940,409 @@
               <a:latin typeface="Courier New" panose="02070309020205020404" pitchFamily="49" charset="0"/>
               <a:cs typeface="Courier New" panose="02070309020205020404" pitchFamily="49" charset="0"/>
             </a:endParaRPr>
+          </a:p>
+        </p:txBody>
+      </p:sp>
+      <p:sp>
+        <p:nvSpPr>
+          <p:cNvPr id="13" name="Oval 12">
+            <a:extLst>
+              <a:ext uri="{FF2B5EF4-FFF2-40B4-BE49-F238E27FC236}">
+                <a16:creationId xmlns:a16="http://schemas.microsoft.com/office/drawing/2014/main" id="{47D6F60D-68AB-42F9-A861-D0C5BD2AB4F8}"/>
+              </a:ext>
+            </a:extLst>
+          </p:cNvPr>
+          <p:cNvSpPr/>
+          <p:nvPr/>
+        </p:nvSpPr>
+        <p:spPr>
+          <a:xfrm>
+            <a:off x="6858000" y="2047929"/>
+            <a:ext cx="835269" cy="335763"/>
+          </a:xfrm>
+          <a:prstGeom prst="ellipse">
+            <a:avLst/>
+          </a:prstGeom>
+          <a:noFill/>
+          <a:ln>
+            <a:solidFill>
+              <a:srgbClr val="FF0000"/>
+            </a:solidFill>
+          </a:ln>
+        </p:spPr>
+        <p:style>
+          <a:lnRef idx="2">
+            <a:schemeClr val="accent1">
+              <a:shade val="50000"/>
+            </a:schemeClr>
+          </a:lnRef>
+          <a:fillRef idx="1">
+            <a:schemeClr val="accent1"/>
+          </a:fillRef>
+          <a:effectRef idx="0">
+            <a:schemeClr val="accent1"/>
+          </a:effectRef>
+          <a:fontRef idx="minor">
+            <a:schemeClr val="lt1"/>
+          </a:fontRef>
+        </p:style>
+        <p:txBody>
+          <a:bodyPr rtlCol="0" anchor="ctr"/>
+          <a:lstStyle/>
+          <a:p>
+            <a:pPr algn="ctr"/>
+            <a:endParaRPr lang="en-SG"/>
+          </a:p>
+        </p:txBody>
+      </p:sp>
+      <p:cxnSp>
+        <p:nvCxnSpPr>
+          <p:cNvPr id="14" name="Straight Arrow Connector 13">
+            <a:extLst>
+              <a:ext uri="{FF2B5EF4-FFF2-40B4-BE49-F238E27FC236}">
+                <a16:creationId xmlns:a16="http://schemas.microsoft.com/office/drawing/2014/main" id="{3A3AD5AD-00DF-41D1-AC0F-D43C8D761EEE}"/>
+              </a:ext>
+            </a:extLst>
+          </p:cNvPr>
+          <p:cNvCxnSpPr/>
+          <p:nvPr/>
+        </p:nvCxnSpPr>
+        <p:spPr>
+          <a:xfrm flipV="1">
+            <a:off x="7660699" y="1880191"/>
+            <a:ext cx="665980" cy="267324"/>
+          </a:xfrm>
+          <a:prstGeom prst="straightConnector1">
+            <a:avLst/>
+          </a:prstGeom>
+          <a:ln>
+            <a:solidFill>
+              <a:srgbClr val="FF0000"/>
+            </a:solidFill>
+            <a:tailEnd type="triangle"/>
+          </a:ln>
+        </p:spPr>
+        <p:style>
+          <a:lnRef idx="1">
+            <a:schemeClr val="accent1"/>
+          </a:lnRef>
+          <a:fillRef idx="0">
+            <a:schemeClr val="accent1"/>
+          </a:fillRef>
+          <a:effectRef idx="0">
+            <a:schemeClr val="accent1"/>
+          </a:effectRef>
+          <a:fontRef idx="minor">
+            <a:schemeClr val="tx1"/>
+          </a:fontRef>
+        </p:style>
+      </p:cxnSp>
+      <p:sp>
+        <p:nvSpPr>
+          <p:cNvPr id="15" name="TextBox 14">
+            <a:extLst>
+              <a:ext uri="{FF2B5EF4-FFF2-40B4-BE49-F238E27FC236}">
+                <a16:creationId xmlns:a16="http://schemas.microsoft.com/office/drawing/2014/main" id="{791AF316-B637-419B-9A31-F84CD75FCB9D}"/>
+              </a:ext>
+            </a:extLst>
+          </p:cNvPr>
+          <p:cNvSpPr txBox="1"/>
+          <p:nvPr/>
+        </p:nvSpPr>
+        <p:spPr>
+          <a:xfrm>
+            <a:off x="8326679" y="1720398"/>
+            <a:ext cx="2165838" cy="369332"/>
+          </a:xfrm>
+          <a:prstGeom prst="rect">
+            <a:avLst/>
+          </a:prstGeom>
+          <a:noFill/>
+        </p:spPr>
+        <p:txBody>
+          <a:bodyPr wrap="square" rtlCol="0">
+            <a:spAutoFit/>
+          </a:bodyPr>
+          <a:lstStyle/>
+          <a:p>
+            <a:r>
+              <a:rPr lang="en-SG" dirty="0">
+                <a:solidFill>
+                  <a:srgbClr val="FF0000"/>
+                </a:solidFill>
+              </a:rPr>
+              <a:t>Evaluates to false</a:t>
+            </a:r>
+          </a:p>
+        </p:txBody>
+      </p:sp>
+      <p:sp>
+        <p:nvSpPr>
+          <p:cNvPr id="16" name="Oval 15">
+            <a:extLst>
+              <a:ext uri="{FF2B5EF4-FFF2-40B4-BE49-F238E27FC236}">
+                <a16:creationId xmlns:a16="http://schemas.microsoft.com/office/drawing/2014/main" id="{E698F893-548C-4DB3-BE27-FAECBFD75E76}"/>
+              </a:ext>
+            </a:extLst>
+          </p:cNvPr>
+          <p:cNvSpPr/>
+          <p:nvPr/>
+        </p:nvSpPr>
+        <p:spPr>
+          <a:xfrm>
+            <a:off x="7302010" y="2758517"/>
+            <a:ext cx="835269" cy="335763"/>
+          </a:xfrm>
+          <a:prstGeom prst="ellipse">
+            <a:avLst/>
+          </a:prstGeom>
+          <a:noFill/>
+          <a:ln>
+            <a:solidFill>
+              <a:srgbClr val="FF0000"/>
+            </a:solidFill>
+          </a:ln>
+        </p:spPr>
+        <p:style>
+          <a:lnRef idx="2">
+            <a:schemeClr val="accent1">
+              <a:shade val="50000"/>
+            </a:schemeClr>
+          </a:lnRef>
+          <a:fillRef idx="1">
+            <a:schemeClr val="accent1"/>
+          </a:fillRef>
+          <a:effectRef idx="0">
+            <a:schemeClr val="accent1"/>
+          </a:effectRef>
+          <a:fontRef idx="minor">
+            <a:schemeClr val="lt1"/>
+          </a:fontRef>
+        </p:style>
+        <p:txBody>
+          <a:bodyPr rtlCol="0" anchor="ctr"/>
+          <a:lstStyle/>
+          <a:p>
+            <a:pPr algn="ctr"/>
+            <a:endParaRPr lang="en-SG"/>
+          </a:p>
+        </p:txBody>
+      </p:sp>
+      <p:cxnSp>
+        <p:nvCxnSpPr>
+          <p:cNvPr id="18" name="Straight Arrow Connector 17">
+            <a:extLst>
+              <a:ext uri="{FF2B5EF4-FFF2-40B4-BE49-F238E27FC236}">
+                <a16:creationId xmlns:a16="http://schemas.microsoft.com/office/drawing/2014/main" id="{A0C74A96-E709-461F-812D-7C9526405449}"/>
+              </a:ext>
+            </a:extLst>
+          </p:cNvPr>
+          <p:cNvCxnSpPr>
+            <a:cxnSpLocks/>
+          </p:cNvCxnSpPr>
+          <p:nvPr/>
+        </p:nvCxnSpPr>
+        <p:spPr>
+          <a:xfrm flipV="1">
+            <a:off x="8141387" y="2790764"/>
+            <a:ext cx="753208" cy="88962"/>
+          </a:xfrm>
+          <a:prstGeom prst="straightConnector1">
+            <a:avLst/>
+          </a:prstGeom>
+          <a:ln>
+            <a:solidFill>
+              <a:srgbClr val="FF0000"/>
+            </a:solidFill>
+            <a:tailEnd type="triangle"/>
+          </a:ln>
+        </p:spPr>
+        <p:style>
+          <a:lnRef idx="1">
+            <a:schemeClr val="accent1"/>
+          </a:lnRef>
+          <a:fillRef idx="0">
+            <a:schemeClr val="accent1"/>
+          </a:fillRef>
+          <a:effectRef idx="0">
+            <a:schemeClr val="accent1"/>
+          </a:effectRef>
+          <a:fontRef idx="minor">
+            <a:schemeClr val="tx1"/>
+          </a:fontRef>
+        </p:style>
+      </p:cxnSp>
+      <p:sp>
+        <p:nvSpPr>
+          <p:cNvPr id="19" name="TextBox 18">
+            <a:extLst>
+              <a:ext uri="{FF2B5EF4-FFF2-40B4-BE49-F238E27FC236}">
+                <a16:creationId xmlns:a16="http://schemas.microsoft.com/office/drawing/2014/main" id="{80F7C470-F799-46EC-8940-9F6BB1BFE8C4}"/>
+              </a:ext>
+            </a:extLst>
+          </p:cNvPr>
+          <p:cNvSpPr txBox="1"/>
+          <p:nvPr/>
+        </p:nvSpPr>
+        <p:spPr>
+          <a:xfrm>
+            <a:off x="8894595" y="2606098"/>
+            <a:ext cx="2165838" cy="369332"/>
+          </a:xfrm>
+          <a:prstGeom prst="rect">
+            <a:avLst/>
+          </a:prstGeom>
+          <a:noFill/>
+        </p:spPr>
+        <p:txBody>
+          <a:bodyPr wrap="square" rtlCol="0">
+            <a:spAutoFit/>
+          </a:bodyPr>
+          <a:lstStyle/>
+          <a:p>
+            <a:r>
+              <a:rPr lang="en-SG" dirty="0">
+                <a:solidFill>
+                  <a:srgbClr val="FF0000"/>
+                </a:solidFill>
+              </a:rPr>
+              <a:t>Evaluates to true</a:t>
+            </a:r>
+          </a:p>
+        </p:txBody>
+      </p:sp>
+      <p:sp>
+        <p:nvSpPr>
+          <p:cNvPr id="20" name="Oval 19">
+            <a:extLst>
+              <a:ext uri="{FF2B5EF4-FFF2-40B4-BE49-F238E27FC236}">
+                <a16:creationId xmlns:a16="http://schemas.microsoft.com/office/drawing/2014/main" id="{6228CFA9-5EE7-4C4B-A460-9FCD811EC578}"/>
+              </a:ext>
+            </a:extLst>
+          </p:cNvPr>
+          <p:cNvSpPr/>
+          <p:nvPr/>
+        </p:nvSpPr>
+        <p:spPr>
+          <a:xfrm>
+            <a:off x="7318131" y="3466114"/>
+            <a:ext cx="835269" cy="335763"/>
+          </a:xfrm>
+          <a:prstGeom prst="ellipse">
+            <a:avLst/>
+          </a:prstGeom>
+          <a:noFill/>
+          <a:ln>
+            <a:solidFill>
+              <a:srgbClr val="FF0000"/>
+            </a:solidFill>
+          </a:ln>
+        </p:spPr>
+        <p:style>
+          <a:lnRef idx="2">
+            <a:schemeClr val="accent1">
+              <a:shade val="50000"/>
+            </a:schemeClr>
+          </a:lnRef>
+          <a:fillRef idx="1">
+            <a:schemeClr val="accent1"/>
+          </a:fillRef>
+          <a:effectRef idx="0">
+            <a:schemeClr val="accent1"/>
+          </a:effectRef>
+          <a:fontRef idx="minor">
+            <a:schemeClr val="lt1"/>
+          </a:fontRef>
+        </p:style>
+        <p:txBody>
+          <a:bodyPr rtlCol="0" anchor="ctr"/>
+          <a:lstStyle/>
+          <a:p>
+            <a:pPr algn="ctr"/>
+            <a:endParaRPr lang="en-SG"/>
+          </a:p>
+        </p:txBody>
+      </p:sp>
+      <p:cxnSp>
+        <p:nvCxnSpPr>
+          <p:cNvPr id="21" name="Straight Arrow Connector 20">
+            <a:extLst>
+              <a:ext uri="{FF2B5EF4-FFF2-40B4-BE49-F238E27FC236}">
+                <a16:creationId xmlns:a16="http://schemas.microsoft.com/office/drawing/2014/main" id="{312676C0-AF08-4FC5-8EF9-06302A4321CF}"/>
+              </a:ext>
+            </a:extLst>
+          </p:cNvPr>
+          <p:cNvCxnSpPr>
+            <a:cxnSpLocks/>
+          </p:cNvCxnSpPr>
+          <p:nvPr/>
+        </p:nvCxnSpPr>
+        <p:spPr>
+          <a:xfrm flipV="1">
+            <a:off x="8065187" y="3435963"/>
+            <a:ext cx="753208" cy="88962"/>
+          </a:xfrm>
+          <a:prstGeom prst="straightConnector1">
+            <a:avLst/>
+          </a:prstGeom>
+          <a:ln>
+            <a:solidFill>
+              <a:srgbClr val="FF0000"/>
+            </a:solidFill>
+            <a:tailEnd type="triangle"/>
+          </a:ln>
+        </p:spPr>
+        <p:style>
+          <a:lnRef idx="1">
+            <a:schemeClr val="accent1"/>
+          </a:lnRef>
+          <a:fillRef idx="0">
+            <a:schemeClr val="accent1"/>
+          </a:fillRef>
+          <a:effectRef idx="0">
+            <a:schemeClr val="accent1"/>
+          </a:effectRef>
+          <a:fontRef idx="minor">
+            <a:schemeClr val="tx1"/>
+          </a:fontRef>
+        </p:style>
+      </p:cxnSp>
+      <p:sp>
+        <p:nvSpPr>
+          <p:cNvPr id="22" name="TextBox 21">
+            <a:extLst>
+              <a:ext uri="{FF2B5EF4-FFF2-40B4-BE49-F238E27FC236}">
+                <a16:creationId xmlns:a16="http://schemas.microsoft.com/office/drawing/2014/main" id="{033E7833-6551-43F6-9B3F-163A0D31F840}"/>
+              </a:ext>
+            </a:extLst>
+          </p:cNvPr>
+          <p:cNvSpPr txBox="1"/>
+          <p:nvPr/>
+        </p:nvSpPr>
+        <p:spPr>
+          <a:xfrm>
+            <a:off x="8894595" y="3333075"/>
+            <a:ext cx="3186414" cy="369332"/>
+          </a:xfrm>
+          <a:prstGeom prst="rect">
+            <a:avLst/>
+          </a:prstGeom>
+          <a:noFill/>
+        </p:spPr>
+        <p:txBody>
+          <a:bodyPr wrap="square" rtlCol="0">
+            <a:spAutoFit/>
+          </a:bodyPr>
+          <a:lstStyle/>
+          <a:p>
+            <a:r>
+              <a:rPr lang="en-SG" dirty="0">
+                <a:solidFill>
+                  <a:srgbClr val="FF0000"/>
+                </a:solidFill>
+              </a:rPr>
+              <a:t>Evaluates to true but is skipped</a:t>
+            </a:r>
           </a:p>
         </p:txBody>
       </p:sp>

</xml_diff>